<commit_message>
[~] Lecture1: small corrections [+] Lab1
</commit_message>
<xml_diff>
--- a/Lectures/1.Introduction/Lecture1.pptx
+++ b/Lectures/1.Introduction/Lecture1.pptx
@@ -247,7 +247,7 @@
           <a:p>
             <a:fld id="{8A70136C-4900-4139-A65E-0FFE21BA8660}" type="datetimeFigureOut">
               <a:rPr lang="en-US" smtClean="0"/>
-              <a:t>9/3/2024</a:t>
+              <a:t>9/7/2024</a:t>
             </a:fld>
             <a:endParaRPr lang="en-US"/>
           </a:p>
@@ -40539,7 +40539,15 @@
             <a:pPr lvl="1"/>
             <a:r>
               <a:rPr lang="ru-RU" sz="1800" dirty="0"/>
-              <a:t>тактовая частота - 5 МГц</a:t>
+              <a:t>тактовая частота - </a:t>
+            </a:r>
+            <a:r>
+              <a:rPr lang="en-US" sz="1800" dirty="0"/>
+              <a:t>12</a:t>
+            </a:r>
+            <a:r>
+              <a:rPr lang="ru-RU" sz="1800" dirty="0"/>
+              <a:t> МГц</a:t>
             </a:r>
             <a:r>
               <a:rPr lang="en-US" sz="1800" dirty="0"/>
@@ -40615,7 +40623,15 @@
             <a:pPr lvl="1"/>
             <a:r>
               <a:rPr lang="ru-RU" sz="1800" dirty="0"/>
-              <a:t>тактовая частота - 5 МГц</a:t>
+              <a:t>тактовая частота – </a:t>
+            </a:r>
+            <a:r>
+              <a:rPr lang="en-US" sz="1800" dirty="0"/>
+              <a:t>1,4</a:t>
+            </a:r>
+            <a:r>
+              <a:rPr lang="ru-RU" sz="1800" dirty="0"/>
+              <a:t> ГГц</a:t>
             </a:r>
             <a:r>
               <a:rPr lang="en-US" sz="1800" dirty="0"/>

</xml_diff>